<commit_message>
[mod] error bars from sigma to sigma/sqrt(n) #3
</commit_message>
<xml_diff>
--- a/SSD_detection_efficiency.pptx
+++ b/SSD_detection_efficiency.pptx
@@ -259,7 +259,7 @@
           <a:p>
             <a:fld id="{1E44F221-2A30-4F91-9F5C-701F59068711}" type="datetimeFigureOut">
               <a:rPr lang="en-US" smtClean="0"/>
-              <a:t>11/25/2019</a:t>
+              <a:t>12/5/2019</a:t>
             </a:fld>
             <a:endParaRPr lang="en-US"/>
           </a:p>
@@ -429,7 +429,7 @@
           <a:p>
             <a:fld id="{1E44F221-2A30-4F91-9F5C-701F59068711}" type="datetimeFigureOut">
               <a:rPr lang="en-US" smtClean="0"/>
-              <a:t>11/25/2019</a:t>
+              <a:t>12/5/2019</a:t>
             </a:fld>
             <a:endParaRPr lang="en-US"/>
           </a:p>
@@ -609,7 +609,7 @@
           <a:p>
             <a:fld id="{1E44F221-2A30-4F91-9F5C-701F59068711}" type="datetimeFigureOut">
               <a:rPr lang="en-US" smtClean="0"/>
-              <a:t>11/25/2019</a:t>
+              <a:t>12/5/2019</a:t>
             </a:fld>
             <a:endParaRPr lang="en-US"/>
           </a:p>
@@ -779,7 +779,7 @@
           <a:p>
             <a:fld id="{1E44F221-2A30-4F91-9F5C-701F59068711}" type="datetimeFigureOut">
               <a:rPr lang="en-US" smtClean="0"/>
-              <a:t>11/25/2019</a:t>
+              <a:t>12/5/2019</a:t>
             </a:fld>
             <a:endParaRPr lang="en-US"/>
           </a:p>
@@ -1023,7 +1023,7 @@
           <a:p>
             <a:fld id="{1E44F221-2A30-4F91-9F5C-701F59068711}" type="datetimeFigureOut">
               <a:rPr lang="en-US" smtClean="0"/>
-              <a:t>11/25/2019</a:t>
+              <a:t>12/5/2019</a:t>
             </a:fld>
             <a:endParaRPr lang="en-US"/>
           </a:p>
@@ -1255,7 +1255,7 @@
           <a:p>
             <a:fld id="{1E44F221-2A30-4F91-9F5C-701F59068711}" type="datetimeFigureOut">
               <a:rPr lang="en-US" smtClean="0"/>
-              <a:t>11/25/2019</a:t>
+              <a:t>12/5/2019</a:t>
             </a:fld>
             <a:endParaRPr lang="en-US"/>
           </a:p>
@@ -1622,7 +1622,7 @@
           <a:p>
             <a:fld id="{1E44F221-2A30-4F91-9F5C-701F59068711}" type="datetimeFigureOut">
               <a:rPr lang="en-US" smtClean="0"/>
-              <a:t>11/25/2019</a:t>
+              <a:t>12/5/2019</a:t>
             </a:fld>
             <a:endParaRPr lang="en-US"/>
           </a:p>
@@ -1740,7 +1740,7 @@
           <a:p>
             <a:fld id="{1E44F221-2A30-4F91-9F5C-701F59068711}" type="datetimeFigureOut">
               <a:rPr lang="en-US" smtClean="0"/>
-              <a:t>11/25/2019</a:t>
+              <a:t>12/5/2019</a:t>
             </a:fld>
             <a:endParaRPr lang="en-US"/>
           </a:p>
@@ -1835,7 +1835,7 @@
           <a:p>
             <a:fld id="{1E44F221-2A30-4F91-9F5C-701F59068711}" type="datetimeFigureOut">
               <a:rPr lang="en-US" smtClean="0"/>
-              <a:t>11/25/2019</a:t>
+              <a:t>12/5/2019</a:t>
             </a:fld>
             <a:endParaRPr lang="en-US"/>
           </a:p>
@@ -2112,7 +2112,7 @@
           <a:p>
             <a:fld id="{1E44F221-2A30-4F91-9F5C-701F59068711}" type="datetimeFigureOut">
               <a:rPr lang="en-US" smtClean="0"/>
-              <a:t>11/25/2019</a:t>
+              <a:t>12/5/2019</a:t>
             </a:fld>
             <a:endParaRPr lang="en-US"/>
           </a:p>
@@ -2369,7 +2369,7 @@
           <a:p>
             <a:fld id="{1E44F221-2A30-4F91-9F5C-701F59068711}" type="datetimeFigureOut">
               <a:rPr lang="en-US" smtClean="0"/>
-              <a:t>11/25/2019</a:t>
+              <a:t>12/5/2019</a:t>
             </a:fld>
             <a:endParaRPr lang="en-US"/>
           </a:p>
@@ -2582,7 +2582,7 @@
           <a:p>
             <a:fld id="{1E44F221-2A30-4F91-9F5C-701F59068711}" type="datetimeFigureOut">
               <a:rPr lang="en-US" smtClean="0"/>
-              <a:t>11/25/2019</a:t>
+              <a:t>12/5/2019</a:t>
             </a:fld>
             <a:endParaRPr lang="en-US"/>
           </a:p>
@@ -3155,10 +3155,10 @@
       </p:grpSpPr>
       <p:pic>
         <p:nvPicPr>
-          <p:cNvPr id="2" name="Picture 1">
+          <p:cNvPr id="3" name="Picture 2">
             <a:extLst>
               <a:ext uri="{FF2B5EF4-FFF2-40B4-BE49-F238E27FC236}">
-                <a16:creationId xmlns:a16="http://schemas.microsoft.com/office/drawing/2014/main" id="{211CFBFA-758C-4F91-A512-3E7C7254E370}"/>
+                <a16:creationId xmlns:a16="http://schemas.microsoft.com/office/drawing/2014/main" id="{58596ADE-8FB5-4651-B9FF-7E788EE501B2}"/>
               </a:ext>
             </a:extLst>
           </p:cNvPr>
@@ -3169,13 +3169,13 @@
         </p:nvPicPr>
         <p:blipFill rotWithShape="1">
           <a:blip r:embed="rId2"/>
-          <a:srcRect l="33159" t="17457" r="36012" b="10050"/>
+          <a:srcRect l="34504" t="15865" r="35922" b="14830"/>
           <a:stretch/>
         </p:blipFill>
         <p:spPr>
           <a:xfrm>
-            <a:off x="2360526" y="0"/>
-            <a:ext cx="5184948" cy="6858000"/>
+            <a:off x="2351689" y="0"/>
+            <a:ext cx="5202622" cy="6858000"/>
           </a:xfrm>
           <a:prstGeom prst="rect">
             <a:avLst/>
@@ -3297,10 +3297,10 @@
       </p:grpSpPr>
       <p:pic>
         <p:nvPicPr>
-          <p:cNvPr id="2" name="Picture 1">
+          <p:cNvPr id="3" name="Picture 2">
             <a:extLst>
               <a:ext uri="{FF2B5EF4-FFF2-40B4-BE49-F238E27FC236}">
-                <a16:creationId xmlns:a16="http://schemas.microsoft.com/office/drawing/2014/main" id="{BE1E2E55-AFFF-4F45-9B5A-E9F22D9830C3}"/>
+                <a16:creationId xmlns:a16="http://schemas.microsoft.com/office/drawing/2014/main" id="{B62740B2-451E-4264-9E8B-BB516072128F}"/>
               </a:ext>
             </a:extLst>
           </p:cNvPr>
@@ -3311,13 +3311,13 @@
         </p:nvPicPr>
         <p:blipFill rotWithShape="1">
           <a:blip r:embed="rId2"/>
-          <a:srcRect l="33428" t="15388" r="35205" b="9412"/>
+          <a:srcRect l="34504" t="15865" r="35832" b="14989"/>
           <a:stretch/>
         </p:blipFill>
         <p:spPr>
           <a:xfrm>
-            <a:off x="2410309" y="0"/>
-            <a:ext cx="5085382" cy="6858000"/>
+            <a:off x="2337794" y="0"/>
+            <a:ext cx="5230412" cy="6858000"/>
           </a:xfrm>
           <a:prstGeom prst="rect">
             <a:avLst/>
@@ -3439,10 +3439,10 @@
       </p:grpSpPr>
       <p:pic>
         <p:nvPicPr>
-          <p:cNvPr id="2" name="Picture 1">
+          <p:cNvPr id="3" name="Picture 2">
             <a:extLst>
               <a:ext uri="{FF2B5EF4-FFF2-40B4-BE49-F238E27FC236}">
-                <a16:creationId xmlns:a16="http://schemas.microsoft.com/office/drawing/2014/main" id="{A5B1E3F9-CF7E-4C5F-AF1D-3FA55E761662}"/>
+                <a16:creationId xmlns:a16="http://schemas.microsoft.com/office/drawing/2014/main" id="{7BC25372-0D0A-4D26-B4CE-D462CCBA3C88}"/>
               </a:ext>
             </a:extLst>
           </p:cNvPr>
@@ -3453,13 +3453,13 @@
         </p:nvPicPr>
         <p:blipFill rotWithShape="1">
           <a:blip r:embed="rId2"/>
-          <a:srcRect l="34145" t="16024" r="35922" b="10528"/>
+          <a:srcRect l="34593" t="17140" r="36012" b="14670"/>
           <a:stretch/>
         </p:blipFill>
         <p:spPr>
           <a:xfrm>
-            <a:off x="2468648" y="0"/>
-            <a:ext cx="4968703" cy="6858000"/>
+            <a:off x="2325167" y="0"/>
+            <a:ext cx="5255665" cy="6858000"/>
           </a:xfrm>
           <a:prstGeom prst="rect">
             <a:avLst/>
@@ -3581,10 +3581,10 @@
       </p:grpSpPr>
       <p:pic>
         <p:nvPicPr>
-          <p:cNvPr id="2" name="Picture 1">
+          <p:cNvPr id="3" name="Picture 2">
             <a:extLst>
               <a:ext uri="{FF2B5EF4-FFF2-40B4-BE49-F238E27FC236}">
-                <a16:creationId xmlns:a16="http://schemas.microsoft.com/office/drawing/2014/main" id="{C28A4E94-8823-4FA7-854E-E79E68F2A07D}"/>
+                <a16:creationId xmlns:a16="http://schemas.microsoft.com/office/drawing/2014/main" id="{15FA9A0D-0229-4DA6-A9BF-19676591D0C1}"/>
               </a:ext>
             </a:extLst>
           </p:cNvPr>
@@ -3595,13 +3595,13 @@
         </p:nvPicPr>
         <p:blipFill rotWithShape="1">
           <a:blip r:embed="rId2"/>
-          <a:srcRect l="33697" t="15865" r="36191" b="9891"/>
+          <a:srcRect l="34145" t="16502" r="35833" b="14829"/>
           <a:stretch/>
         </p:blipFill>
         <p:spPr>
           <a:xfrm>
-            <a:off x="2480588" y="0"/>
-            <a:ext cx="4944824" cy="6858000"/>
+            <a:off x="2287767" y="0"/>
+            <a:ext cx="5330465" cy="6858000"/>
           </a:xfrm>
           <a:prstGeom prst="rect">
             <a:avLst/>
@@ -3771,10 +3771,10 @@
       </p:pic>
       <p:pic>
         <p:nvPicPr>
-          <p:cNvPr id="3" name="Picture 2">
+          <p:cNvPr id="4" name="Picture 3">
             <a:extLst>
               <a:ext uri="{FF2B5EF4-FFF2-40B4-BE49-F238E27FC236}">
-                <a16:creationId xmlns:a16="http://schemas.microsoft.com/office/drawing/2014/main" id="{080BCE23-9C32-48E2-9382-80BE9E079952}"/>
+                <a16:creationId xmlns:a16="http://schemas.microsoft.com/office/drawing/2014/main" id="{C597ED71-092A-444E-933A-8521EEEB230A}"/>
               </a:ext>
             </a:extLst>
           </p:cNvPr>
@@ -3785,13 +3785,13 @@
         </p:nvPicPr>
         <p:blipFill rotWithShape="1">
           <a:blip r:embed="rId3"/>
-          <a:srcRect l="34235" t="13512" r="36998" b="11006"/>
+          <a:srcRect l="28768" t="15706" r="42823" b="14829"/>
           <a:stretch/>
         </p:blipFill>
         <p:spPr>
           <a:xfrm>
-            <a:off x="4953000" y="0"/>
-            <a:ext cx="4646583" cy="6858000"/>
+            <a:off x="4953000" y="22835"/>
+            <a:ext cx="4953000" cy="6812329"/>
           </a:xfrm>
           <a:prstGeom prst="rect">
             <a:avLst/>
@@ -3859,10 +3859,10 @@
       </p:pic>
       <p:pic>
         <p:nvPicPr>
-          <p:cNvPr id="3" name="Picture 2">
+          <p:cNvPr id="4" name="Picture 3">
             <a:extLst>
               <a:ext uri="{FF2B5EF4-FFF2-40B4-BE49-F238E27FC236}">
-                <a16:creationId xmlns:a16="http://schemas.microsoft.com/office/drawing/2014/main" id="{99AA553E-7CFC-4A46-A76B-67EC38B2EE7E}"/>
+                <a16:creationId xmlns:a16="http://schemas.microsoft.com/office/drawing/2014/main" id="{7185ED34-6054-43BC-B275-E3E897766D41}"/>
               </a:ext>
             </a:extLst>
           </p:cNvPr>
@@ -3873,13 +3873,13 @@
         </p:nvPicPr>
         <p:blipFill rotWithShape="1">
           <a:blip r:embed="rId3"/>
-          <a:srcRect l="33428" t="15865" r="37356" b="10846"/>
+          <a:srcRect l="34952" t="15865" r="36550" b="14285"/>
           <a:stretch/>
         </p:blipFill>
         <p:spPr>
           <a:xfrm>
-            <a:off x="4953000" y="0"/>
-            <a:ext cx="4860236" cy="6858000"/>
+            <a:off x="4953000" y="14679"/>
+            <a:ext cx="4953000" cy="6828642"/>
           </a:xfrm>
           <a:prstGeom prst="rect">
             <a:avLst/>
@@ -3947,10 +3947,10 @@
       </p:pic>
       <p:pic>
         <p:nvPicPr>
-          <p:cNvPr id="3" name="Picture 2">
+          <p:cNvPr id="4" name="Picture 3">
             <a:extLst>
               <a:ext uri="{FF2B5EF4-FFF2-40B4-BE49-F238E27FC236}">
-                <a16:creationId xmlns:a16="http://schemas.microsoft.com/office/drawing/2014/main" id="{4D4CA493-77B1-4279-AD71-1ADF243BD779}"/>
+                <a16:creationId xmlns:a16="http://schemas.microsoft.com/office/drawing/2014/main" id="{557D763D-CC0F-4C68-8AD3-82DFE7ACD1DB}"/>
               </a:ext>
             </a:extLst>
           </p:cNvPr>
@@ -3961,13 +3961,13 @@
         </p:nvPicPr>
         <p:blipFill rotWithShape="1">
           <a:blip r:embed="rId3"/>
-          <a:srcRect l="33607" t="15865" r="37804" b="10369"/>
+          <a:srcRect l="35489" t="16660" r="36908" b="14623"/>
           <a:stretch/>
         </p:blipFill>
         <p:spPr>
           <a:xfrm>
             <a:off x="4953000" y="0"/>
-            <a:ext cx="4725059" cy="6858000"/>
+            <a:ext cx="4897431" cy="6858000"/>
           </a:xfrm>
           <a:prstGeom prst="rect">
             <a:avLst/>
@@ -4035,10 +4035,10 @@
       </p:pic>
       <p:pic>
         <p:nvPicPr>
-          <p:cNvPr id="3" name="Picture 2">
+          <p:cNvPr id="4" name="Picture 3">
             <a:extLst>
               <a:ext uri="{FF2B5EF4-FFF2-40B4-BE49-F238E27FC236}">
-                <a16:creationId xmlns:a16="http://schemas.microsoft.com/office/drawing/2014/main" id="{54CCEA33-965B-4FF1-831B-33E9164A5263}"/>
+                <a16:creationId xmlns:a16="http://schemas.microsoft.com/office/drawing/2014/main" id="{5EB70073-1F17-4540-8A74-0958FF31E2C4}"/>
               </a:ext>
             </a:extLst>
           </p:cNvPr>
@@ -4049,13 +4049,13 @@
         </p:nvPicPr>
         <p:blipFill rotWithShape="1">
           <a:blip r:embed="rId3"/>
-          <a:srcRect l="34772" t="16821" r="36460" b="10528"/>
+          <a:srcRect l="35758" t="15865" r="36460" b="14670"/>
           <a:stretch/>
         </p:blipFill>
         <p:spPr>
           <a:xfrm>
             <a:off x="4953000" y="0"/>
-            <a:ext cx="4827670" cy="6858000"/>
+            <a:ext cx="4876102" cy="6858000"/>
           </a:xfrm>
           <a:prstGeom prst="rect">
             <a:avLst/>
@@ -4123,10 +4123,10 @@
       </p:pic>
       <p:pic>
         <p:nvPicPr>
-          <p:cNvPr id="3" name="Picture 2">
+          <p:cNvPr id="4" name="Picture 3">
             <a:extLst>
               <a:ext uri="{FF2B5EF4-FFF2-40B4-BE49-F238E27FC236}">
-                <a16:creationId xmlns:a16="http://schemas.microsoft.com/office/drawing/2014/main" id="{0DB57FD0-3703-44E3-AC7C-C17D93FF3563}"/>
+                <a16:creationId xmlns:a16="http://schemas.microsoft.com/office/drawing/2014/main" id="{93EAFA3C-8633-4F17-9789-C6E54AB72C30}"/>
               </a:ext>
             </a:extLst>
           </p:cNvPr>
@@ -4137,13 +4137,13 @@
         </p:nvPicPr>
         <p:blipFill rotWithShape="1">
           <a:blip r:embed="rId3"/>
-          <a:srcRect l="34505" t="16502" r="36728" b="10368"/>
+          <a:srcRect l="35489" t="16502" r="36818" b="15148"/>
           <a:stretch/>
         </p:blipFill>
         <p:spPr>
           <a:xfrm>
             <a:off x="4953000" y="0"/>
-            <a:ext cx="4796120" cy="6858000"/>
+            <a:ext cx="4939681" cy="6858000"/>
           </a:xfrm>
           <a:prstGeom prst="rect">
             <a:avLst/>
@@ -4211,10 +4211,10 @@
       </p:pic>
       <p:pic>
         <p:nvPicPr>
-          <p:cNvPr id="3" name="Picture 2">
+          <p:cNvPr id="4" name="Picture 3">
             <a:extLst>
               <a:ext uri="{FF2B5EF4-FFF2-40B4-BE49-F238E27FC236}">
-                <a16:creationId xmlns:a16="http://schemas.microsoft.com/office/drawing/2014/main" id="{A22F3995-1E4A-4363-9691-3980102DA378}"/>
+                <a16:creationId xmlns:a16="http://schemas.microsoft.com/office/drawing/2014/main" id="{52B26731-62CF-4574-82BD-3FAD82AA1CA6}"/>
               </a:ext>
             </a:extLst>
           </p:cNvPr>
@@ -4225,13 +4225,13 @@
         </p:nvPicPr>
         <p:blipFill rotWithShape="1">
           <a:blip r:embed="rId3"/>
-          <a:srcRect l="34682" t="15865" r="36281" b="10147"/>
+          <a:srcRect l="35310" t="16502" r="36549" b="15148"/>
           <a:stretch/>
         </p:blipFill>
         <p:spPr>
           <a:xfrm>
-            <a:off x="4953000" y="0"/>
-            <a:ext cx="4784723" cy="6858000"/>
+            <a:off x="4953000" y="45501"/>
+            <a:ext cx="4953000" cy="6766997"/>
           </a:xfrm>
           <a:prstGeom prst="rect">
             <a:avLst/>
@@ -4270,10 +4270,10 @@
       </p:grpSpPr>
       <p:pic>
         <p:nvPicPr>
-          <p:cNvPr id="2" name="Picture 1">
+          <p:cNvPr id="3" name="Picture 2">
             <a:extLst>
               <a:ext uri="{FF2B5EF4-FFF2-40B4-BE49-F238E27FC236}">
-                <a16:creationId xmlns:a16="http://schemas.microsoft.com/office/drawing/2014/main" id="{746325A4-3184-4DDD-8B1E-69F3CC16A87E}"/>
+                <a16:creationId xmlns:a16="http://schemas.microsoft.com/office/drawing/2014/main" id="{EAC53814-0291-419A-B8B8-C85C94DF2976}"/>
               </a:ext>
             </a:extLst>
           </p:cNvPr>
@@ -4284,13 +4284,13 @@
         </p:nvPicPr>
         <p:blipFill rotWithShape="1">
           <a:blip r:embed="rId2"/>
-          <a:srcRect l="4123" t="12679" r="13876" b="5111"/>
+          <a:srcRect l="3584" t="12679" r="13428" b="5589"/>
           <a:stretch/>
         </p:blipFill>
         <p:spPr>
           <a:xfrm>
-            <a:off x="0" y="635833"/>
-            <a:ext cx="9906000" cy="5586333"/>
+            <a:off x="0" y="685060"/>
+            <a:ext cx="9906000" cy="5487880"/>
           </a:xfrm>
           <a:prstGeom prst="rect">
             <a:avLst/>

</xml_diff>